<commit_message>
Add jump, slide DD
</commit_message>
<xml_diff>
--- a/AD산출물.pptx
+++ b/AD산출물.pptx
@@ -5,7 +5,7 @@
     <p:sldMasterId id="2147483648" r:id="rId1"/>
   </p:sldMasterIdLst>
   <p:notesMasterIdLst>
-    <p:notesMasterId r:id="rId16"/>
+    <p:notesMasterId r:id="rId17"/>
   </p:notesMasterIdLst>
   <p:sldIdLst>
     <p:sldId id="256" r:id="rId2"/>
@@ -18,10 +18,11 @@
     <p:sldId id="262" r:id="rId9"/>
     <p:sldId id="264" r:id="rId10"/>
     <p:sldId id="269" r:id="rId11"/>
-    <p:sldId id="265" r:id="rId12"/>
-    <p:sldId id="266" r:id="rId13"/>
-    <p:sldId id="267" r:id="rId14"/>
-    <p:sldId id="270" r:id="rId15"/>
+    <p:sldId id="271" r:id="rId12"/>
+    <p:sldId id="265" r:id="rId13"/>
+    <p:sldId id="266" r:id="rId14"/>
+    <p:sldId id="267" r:id="rId15"/>
+    <p:sldId id="270" r:id="rId16"/>
   </p:sldIdLst>
   <p:sldSz cx="12192000" cy="6858000"/>
   <p:notesSz cx="6858000" cy="9144000"/>
@@ -120,6 +121,11 @@
       </a:defRPr>
     </a:lvl9pPr>
   </p:defaultTextStyle>
+  <p:extLst>
+    <p:ext uri="{EFAFB233-063F-42B5-8137-9DF3F51BA10A}">
+      <p15:sldGuideLst xmlns:p15="http://schemas.microsoft.com/office/powerpoint/2012/main"/>
+    </p:ext>
+  </p:extLst>
 </p:presentation>
 </file>
 
@@ -205,7 +211,7 @@
           <a:p>
             <a:fld id="{E7D0CD28-E189-49F6-B8B0-48E38BB9A694}" type="datetimeFigureOut">
               <a:rPr lang="ko-KR" altLang="en-US" smtClean="0"/>
-              <a:t>2020-11-30</a:t>
+              <a:t>2020-12-01</a:t>
             </a:fld>
             <a:endParaRPr lang="ko-KR" altLang="en-US"/>
           </a:p>
@@ -619,7 +625,7 @@
           <a:p>
             <a:fld id="{019F069A-B44E-4DE5-8DD5-CA01B315C983}" type="datetimeFigureOut">
               <a:rPr lang="ko-KR" altLang="en-US" smtClean="0"/>
-              <a:t>2020-11-30</a:t>
+              <a:t>2020-12-01</a:t>
             </a:fld>
             <a:endParaRPr lang="ko-KR" altLang="en-US"/>
           </a:p>
@@ -817,7 +823,7 @@
           <a:p>
             <a:fld id="{019F069A-B44E-4DE5-8DD5-CA01B315C983}" type="datetimeFigureOut">
               <a:rPr lang="ko-KR" altLang="en-US" smtClean="0"/>
-              <a:t>2020-11-30</a:t>
+              <a:t>2020-12-01</a:t>
             </a:fld>
             <a:endParaRPr lang="ko-KR" altLang="en-US"/>
           </a:p>
@@ -1025,7 +1031,7 @@
           <a:p>
             <a:fld id="{019F069A-B44E-4DE5-8DD5-CA01B315C983}" type="datetimeFigureOut">
               <a:rPr lang="ko-KR" altLang="en-US" smtClean="0"/>
-              <a:t>2020-11-30</a:t>
+              <a:t>2020-12-01</a:t>
             </a:fld>
             <a:endParaRPr lang="ko-KR" altLang="en-US"/>
           </a:p>
@@ -1223,7 +1229,7 @@
           <a:p>
             <a:fld id="{019F069A-B44E-4DE5-8DD5-CA01B315C983}" type="datetimeFigureOut">
               <a:rPr lang="ko-KR" altLang="en-US" smtClean="0"/>
-              <a:t>2020-11-30</a:t>
+              <a:t>2020-12-01</a:t>
             </a:fld>
             <a:endParaRPr lang="ko-KR" altLang="en-US"/>
           </a:p>
@@ -1498,7 +1504,7 @@
           <a:p>
             <a:fld id="{019F069A-B44E-4DE5-8DD5-CA01B315C983}" type="datetimeFigureOut">
               <a:rPr lang="ko-KR" altLang="en-US" smtClean="0"/>
-              <a:t>2020-11-30</a:t>
+              <a:t>2020-12-01</a:t>
             </a:fld>
             <a:endParaRPr lang="ko-KR" altLang="en-US"/>
           </a:p>
@@ -1763,7 +1769,7 @@
           <a:p>
             <a:fld id="{019F069A-B44E-4DE5-8DD5-CA01B315C983}" type="datetimeFigureOut">
               <a:rPr lang="ko-KR" altLang="en-US" smtClean="0"/>
-              <a:t>2020-11-30</a:t>
+              <a:t>2020-12-01</a:t>
             </a:fld>
             <a:endParaRPr lang="ko-KR" altLang="en-US"/>
           </a:p>
@@ -2175,7 +2181,7 @@
           <a:p>
             <a:fld id="{019F069A-B44E-4DE5-8DD5-CA01B315C983}" type="datetimeFigureOut">
               <a:rPr lang="ko-KR" altLang="en-US" smtClean="0"/>
-              <a:t>2020-11-30</a:t>
+              <a:t>2020-12-01</a:t>
             </a:fld>
             <a:endParaRPr lang="ko-KR" altLang="en-US"/>
           </a:p>
@@ -2316,7 +2322,7 @@
           <a:p>
             <a:fld id="{019F069A-B44E-4DE5-8DD5-CA01B315C983}" type="datetimeFigureOut">
               <a:rPr lang="ko-KR" altLang="en-US" smtClean="0"/>
-              <a:t>2020-11-30</a:t>
+              <a:t>2020-12-01</a:t>
             </a:fld>
             <a:endParaRPr lang="ko-KR" altLang="en-US"/>
           </a:p>
@@ -2429,7 +2435,7 @@
           <a:p>
             <a:fld id="{019F069A-B44E-4DE5-8DD5-CA01B315C983}" type="datetimeFigureOut">
               <a:rPr lang="ko-KR" altLang="en-US" smtClean="0"/>
-              <a:t>2020-11-30</a:t>
+              <a:t>2020-12-01</a:t>
             </a:fld>
             <a:endParaRPr lang="ko-KR" altLang="en-US"/>
           </a:p>
@@ -2740,7 +2746,7 @@
           <a:p>
             <a:fld id="{019F069A-B44E-4DE5-8DD5-CA01B315C983}" type="datetimeFigureOut">
               <a:rPr lang="ko-KR" altLang="en-US" smtClean="0"/>
-              <a:t>2020-11-30</a:t>
+              <a:t>2020-12-01</a:t>
             </a:fld>
             <a:endParaRPr lang="ko-KR" altLang="en-US"/>
           </a:p>
@@ -3028,7 +3034,7 @@
           <a:p>
             <a:fld id="{019F069A-B44E-4DE5-8DD5-CA01B315C983}" type="datetimeFigureOut">
               <a:rPr lang="ko-KR" altLang="en-US" smtClean="0"/>
-              <a:t>2020-11-30</a:t>
+              <a:t>2020-12-01</a:t>
             </a:fld>
             <a:endParaRPr lang="ko-KR" altLang="en-US"/>
           </a:p>
@@ -3269,7 +3275,7 @@
           <a:p>
             <a:fld id="{019F069A-B44E-4DE5-8DD5-CA01B315C983}" type="datetimeFigureOut">
               <a:rPr lang="ko-KR" altLang="en-US" smtClean="0"/>
-              <a:t>2020-11-30</a:t>
+              <a:t>2020-12-01</a:t>
             </a:fld>
             <a:endParaRPr lang="ko-KR" altLang="en-US"/>
           </a:p>
@@ -5911,6 +5917,889 @@
           <p:cNvPr id="2" name="제목 1">
             <a:extLst>
               <a:ext uri="{FF2B5EF4-FFF2-40B4-BE49-F238E27FC236}">
+                <a16:creationId xmlns:a16="http://schemas.microsoft.com/office/drawing/2014/main" id="{680F62B8-004B-4B92-81DD-DDC054278628}"/>
+              </a:ext>
+            </a:extLst>
+          </p:cNvPr>
+          <p:cNvSpPr>
+            <a:spLocks noGrp="1"/>
+          </p:cNvSpPr>
+          <p:nvPr>
+            <p:ph type="title"/>
+          </p:nvPr>
+        </p:nvSpPr>
+        <p:spPr/>
+        <p:txBody>
+          <a:bodyPr/>
+          <a:lstStyle/>
+          <a:p>
+            <a:r>
+              <a:rPr lang="ko-KR" altLang="en-US" b="1">
+                <a:latin typeface="HY견고딕" panose="02030600000101010101" pitchFamily="18" charset="-127"/>
+                <a:ea typeface="HY견고딕" panose="02030600000101010101" pitchFamily="18" charset="-127"/>
+              </a:rPr>
+              <a:t>구현 </a:t>
+            </a:r>
+            <a:r>
+              <a:rPr lang="ko-KR" altLang="en-US" b="1" dirty="0">
+                <a:latin typeface="HY견고딕" panose="02030600000101010101" pitchFamily="18" charset="-127"/>
+                <a:ea typeface="HY견고딕" panose="02030600000101010101" pitchFamily="18" charset="-127"/>
+              </a:rPr>
+              <a:t>상세 설계 </a:t>
+            </a:r>
+            <a:r>
+              <a:rPr lang="en-US" altLang="ko-KR" b="1" dirty="0">
+                <a:latin typeface="HY견고딕" panose="02030600000101010101" pitchFamily="18" charset="-127"/>
+                <a:ea typeface="HY견고딕" panose="02030600000101010101" pitchFamily="18" charset="-127"/>
+              </a:rPr>
+              <a:t>(game class)</a:t>
+            </a:r>
+            <a:endParaRPr lang="ko-KR" altLang="en-US" b="1" dirty="0">
+              <a:latin typeface="HY견고딕" panose="02030600000101010101" pitchFamily="18" charset="-127"/>
+              <a:ea typeface="HY견고딕" panose="02030600000101010101" pitchFamily="18" charset="-127"/>
+            </a:endParaRPr>
+          </a:p>
+        </p:txBody>
+      </p:sp>
+      <p:graphicFrame>
+        <p:nvGraphicFramePr>
+          <p:cNvPr id="6" name="표 6">
+            <a:extLst>
+              <a:ext uri="{FF2B5EF4-FFF2-40B4-BE49-F238E27FC236}">
+                <a16:creationId xmlns:a16="http://schemas.microsoft.com/office/drawing/2014/main" id="{BD7C8207-8723-4A20-BF74-D2B13A90E61F}"/>
+              </a:ext>
+            </a:extLst>
+          </p:cNvPr>
+          <p:cNvGraphicFramePr>
+            <a:graphicFrameLocks noGrp="1"/>
+          </p:cNvGraphicFramePr>
+          <p:nvPr>
+            <p:ph idx="1"/>
+            <p:extLst>
+              <p:ext uri="{D42A27DB-BD31-4B8C-83A1-F6EECF244321}">
+                <p14:modId xmlns:p14="http://schemas.microsoft.com/office/powerpoint/2010/main" val="1582726394"/>
+              </p:ext>
+            </p:extLst>
+          </p:nvPr>
+        </p:nvGraphicFramePr>
+        <p:xfrm>
+          <a:off x="838200" y="1826067"/>
+          <a:ext cx="10515601" cy="3876040"/>
+        </p:xfrm>
+        <a:graphic>
+          <a:graphicData uri="http://schemas.openxmlformats.org/drawingml/2006/table">
+            <a:tbl>
+              <a:tblPr firstRow="1" bandRow="1">
+                <a:tableStyleId>{5C22544A-7EE6-4342-B048-85BDC9FD1C3A}</a:tableStyleId>
+              </a:tblPr>
+              <a:tblGrid>
+                <a:gridCol w="2062931">
+                  <a:extLst>
+                    <a:ext uri="{9D8B030D-6E8A-4147-A177-3AD203B41FA5}">
+                      <a16:colId xmlns:a16="http://schemas.microsoft.com/office/drawing/2014/main" val="627403690"/>
+                    </a:ext>
+                  </a:extLst>
+                </a:gridCol>
+                <a:gridCol w="2015614">
+                  <a:extLst>
+                    <a:ext uri="{9D8B030D-6E8A-4147-A177-3AD203B41FA5}">
+                      <a16:colId xmlns:a16="http://schemas.microsoft.com/office/drawing/2014/main" val="3550277370"/>
+                    </a:ext>
+                  </a:extLst>
+                </a:gridCol>
+                <a:gridCol w="2015614">
+                  <a:extLst>
+                    <a:ext uri="{9D8B030D-6E8A-4147-A177-3AD203B41FA5}">
+                      <a16:colId xmlns:a16="http://schemas.microsoft.com/office/drawing/2014/main" val="4061334626"/>
+                    </a:ext>
+                  </a:extLst>
+                </a:gridCol>
+                <a:gridCol w="4421442">
+                  <a:extLst>
+                    <a:ext uri="{9D8B030D-6E8A-4147-A177-3AD203B41FA5}">
+                      <a16:colId xmlns:a16="http://schemas.microsoft.com/office/drawing/2014/main" val="3774375279"/>
+                    </a:ext>
+                  </a:extLst>
+                </a:gridCol>
+              </a:tblGrid>
+              <a:tr h="370840">
+                <a:tc>
+                  <a:txBody>
+                    <a:bodyPr/>
+                    <a:lstStyle/>
+                    <a:p>
+                      <a:pPr algn="ctr" latinLnBrk="1"/>
+                      <a:r>
+                        <a:rPr lang="ko-KR" altLang="en-US" dirty="0"/>
+                        <a:t>기능</a:t>
+                      </a:r>
+                    </a:p>
+                  </a:txBody>
+                  <a:tcPr anchor="ctr"/>
+                </a:tc>
+                <a:tc>
+                  <a:txBody>
+                    <a:bodyPr/>
+                    <a:lstStyle/>
+                    <a:p>
+                      <a:pPr algn="ctr" latinLnBrk="1"/>
+                      <a:r>
+                        <a:rPr lang="ko-KR" altLang="en-US" dirty="0"/>
+                        <a:t>이름</a:t>
+                      </a:r>
+                    </a:p>
+                  </a:txBody>
+                  <a:tcPr anchor="ctr"/>
+                </a:tc>
+                <a:tc>
+                  <a:txBody>
+                    <a:bodyPr/>
+                    <a:lstStyle/>
+                    <a:p>
+                      <a:pPr algn="ctr" latinLnBrk="1"/>
+                      <a:r>
+                        <a:rPr lang="en-US" altLang="ko-KR" dirty="0"/>
+                        <a:t>type</a:t>
+                      </a:r>
+                      <a:endParaRPr lang="ko-KR" altLang="en-US" dirty="0"/>
+                    </a:p>
+                  </a:txBody>
+                  <a:tcPr anchor="ctr"/>
+                </a:tc>
+                <a:tc>
+                  <a:txBody>
+                    <a:bodyPr/>
+                    <a:lstStyle/>
+                    <a:p>
+                      <a:pPr algn="ctr" latinLnBrk="1"/>
+                      <a:r>
+                        <a:rPr lang="ko-KR" altLang="en-US" dirty="0"/>
+                        <a:t>역할</a:t>
+                      </a:r>
+                      <a:r>
+                        <a:rPr lang="en-US" altLang="ko-KR" dirty="0"/>
+                        <a:t>, </a:t>
+                      </a:r>
+                      <a:r>
+                        <a:rPr lang="ko-KR" altLang="en-US" dirty="0"/>
+                        <a:t>설명</a:t>
+                      </a:r>
+                    </a:p>
+                  </a:txBody>
+                  <a:tcPr anchor="ctr"/>
+                </a:tc>
+                <a:extLst>
+                  <a:ext uri="{0D108BD9-81ED-4DB2-BD59-A6C34878D82A}">
+                    <a16:rowId xmlns:a16="http://schemas.microsoft.com/office/drawing/2014/main" val="1568470427"/>
+                  </a:ext>
+                </a:extLst>
+              </a:tr>
+              <a:tr h="370840">
+                <a:tc>
+                  <a:txBody>
+                    <a:bodyPr/>
+                    <a:lstStyle/>
+                    <a:p>
+                      <a:pPr algn="ctr" latinLnBrk="1"/>
+                      <a:r>
+                        <a:rPr lang="en-US" altLang="ko-KR" dirty="0"/>
+                        <a:t>-</a:t>
+                      </a:r>
+                    </a:p>
+                  </a:txBody>
+                  <a:tcPr anchor="ctr"/>
+                </a:tc>
+                <a:tc>
+                  <a:txBody>
+                    <a:bodyPr/>
+                    <a:lstStyle/>
+                    <a:p>
+                      <a:pPr algn="ctr" latinLnBrk="1"/>
+                      <a:r>
+                        <a:rPr lang="en-US" altLang="ko-KR" dirty="0" err="1"/>
+                        <a:t>readyToStart</a:t>
+                      </a:r>
+                      <a:endParaRPr lang="ko-KR" altLang="en-US" dirty="0"/>
+                    </a:p>
+                  </a:txBody>
+                  <a:tcPr anchor="ctr"/>
+                </a:tc>
+                <a:tc>
+                  <a:txBody>
+                    <a:bodyPr/>
+                    <a:lstStyle/>
+                    <a:p>
+                      <a:pPr algn="ctr" latinLnBrk="1"/>
+                      <a:r>
+                        <a:rPr lang="en-US" altLang="ko-KR" dirty="0" err="1"/>
+                        <a:t>boolean</a:t>
+                      </a:r>
+                      <a:endParaRPr lang="ko-KR" altLang="en-US" dirty="0"/>
+                    </a:p>
+                  </a:txBody>
+                  <a:tcPr anchor="ctr"/>
+                </a:tc>
+                <a:tc>
+                  <a:txBody>
+                    <a:bodyPr/>
+                    <a:lstStyle/>
+                    <a:p>
+                      <a:pPr algn="ctr" latinLnBrk="1"/>
+                      <a:r>
+                        <a:rPr lang="ko-KR" altLang="en-US" dirty="0"/>
+                        <a:t>화면 세팅 여부 </a:t>
+                      </a:r>
+                      <a:r>
+                        <a:rPr lang="en-US" altLang="ko-KR" dirty="0" err="1"/>
+                        <a:t>boolean</a:t>
+                      </a:r>
+                      <a:endParaRPr lang="ko-KR" altLang="en-US" dirty="0"/>
+                    </a:p>
+                  </a:txBody>
+                  <a:tcPr anchor="ctr"/>
+                </a:tc>
+                <a:extLst>
+                  <a:ext uri="{0D108BD9-81ED-4DB2-BD59-A6C34878D82A}">
+                    <a16:rowId xmlns:a16="http://schemas.microsoft.com/office/drawing/2014/main" val="3185307735"/>
+                  </a:ext>
+                </a:extLst>
+              </a:tr>
+              <a:tr h="370840">
+                <a:tc rowSpan="6">
+                  <a:txBody>
+                    <a:bodyPr/>
+                    <a:lstStyle/>
+                    <a:p>
+                      <a:pPr algn="ctr" latinLnBrk="1"/>
+                      <a:r>
+                        <a:rPr lang="en-US" altLang="ko-KR" dirty="0"/>
+                        <a:t>jump</a:t>
+                      </a:r>
+                    </a:p>
+                  </a:txBody>
+                  <a:tcPr anchor="ctr"/>
+                </a:tc>
+                <a:tc>
+                  <a:txBody>
+                    <a:bodyPr/>
+                    <a:lstStyle/>
+                    <a:p>
+                      <a:pPr algn="ctr" latinLnBrk="1"/>
+                      <a:r>
+                        <a:rPr lang="en-US" altLang="ko-KR" dirty="0" err="1"/>
+                        <a:t>isJumping</a:t>
+                      </a:r>
+                      <a:endParaRPr lang="ko-KR" altLang="en-US" dirty="0"/>
+                    </a:p>
+                  </a:txBody>
+                  <a:tcPr anchor="ctr"/>
+                </a:tc>
+                <a:tc>
+                  <a:txBody>
+                    <a:bodyPr/>
+                    <a:lstStyle/>
+                    <a:p>
+                      <a:pPr algn="ctr" latinLnBrk="1"/>
+                      <a:r>
+                        <a:rPr lang="en-US" altLang="ko-KR" dirty="0" err="1"/>
+                        <a:t>boolean</a:t>
+                      </a:r>
+                      <a:endParaRPr lang="ko-KR" altLang="en-US" dirty="0"/>
+                    </a:p>
+                  </a:txBody>
+                  <a:tcPr anchor="ctr"/>
+                </a:tc>
+                <a:tc>
+                  <a:txBody>
+                    <a:bodyPr/>
+                    <a:lstStyle/>
+                    <a:p>
+                      <a:pPr algn="ctr" latinLnBrk="1"/>
+                      <a:r>
+                        <a:rPr lang="en-US" altLang="ko-KR" dirty="0"/>
+                        <a:t>True </a:t>
+                      </a:r>
+                      <a:r>
+                        <a:rPr lang="ko-KR" altLang="en-US" dirty="0"/>
+                        <a:t>일 때까지 </a:t>
+                      </a:r>
+                      <a:r>
+                        <a:rPr lang="en-US" altLang="ko-KR" dirty="0"/>
+                        <a:t>jump action</a:t>
+                      </a:r>
+                      <a:endParaRPr lang="ko-KR" altLang="en-US" dirty="0"/>
+                    </a:p>
+                  </a:txBody>
+                  <a:tcPr anchor="ctr"/>
+                </a:tc>
+                <a:extLst>
+                  <a:ext uri="{0D108BD9-81ED-4DB2-BD59-A6C34878D82A}">
+                    <a16:rowId xmlns:a16="http://schemas.microsoft.com/office/drawing/2014/main" val="1404222216"/>
+                  </a:ext>
+                </a:extLst>
+              </a:tr>
+              <a:tr h="370840">
+                <a:tc vMerge="1">
+                  <a:txBody>
+                    <a:bodyPr/>
+                    <a:lstStyle/>
+                    <a:p>
+                      <a:pPr algn="ctr" latinLnBrk="1"/>
+                      <a:endParaRPr lang="ko-KR" altLang="en-US" dirty="0"/>
+                    </a:p>
+                  </a:txBody>
+                  <a:tcPr anchor="ctr"/>
+                </a:tc>
+                <a:tc>
+                  <a:txBody>
+                    <a:bodyPr/>
+                    <a:lstStyle/>
+                    <a:p>
+                      <a:pPr algn="ctr" latinLnBrk="1"/>
+                      <a:r>
+                        <a:rPr lang="en-US" altLang="ko-KR" dirty="0" err="1"/>
+                        <a:t>canJump</a:t>
+                      </a:r>
+                      <a:endParaRPr lang="ko-KR" altLang="en-US" dirty="0"/>
+                    </a:p>
+                  </a:txBody>
+                  <a:tcPr anchor="ctr"/>
+                </a:tc>
+                <a:tc>
+                  <a:txBody>
+                    <a:bodyPr/>
+                    <a:lstStyle/>
+                    <a:p>
+                      <a:pPr algn="ctr" latinLnBrk="1"/>
+                      <a:r>
+                        <a:rPr lang="en-US" altLang="ko-KR" dirty="0" err="1"/>
+                        <a:t>boolean</a:t>
+                      </a:r>
+                      <a:endParaRPr lang="ko-KR" altLang="en-US" dirty="0"/>
+                    </a:p>
+                  </a:txBody>
+                  <a:tcPr anchor="ctr"/>
+                </a:tc>
+                <a:tc>
+                  <a:txBody>
+                    <a:bodyPr/>
+                    <a:lstStyle/>
+                    <a:p>
+                      <a:pPr algn="ctr" latinLnBrk="1"/>
+                      <a:r>
+                        <a:rPr lang="ko-KR" altLang="en-US" dirty="0"/>
+                        <a:t>점프할 수 있는지</a:t>
+                      </a:r>
+                      <a:r>
+                        <a:rPr lang="en-US" altLang="ko-KR" dirty="0"/>
+                        <a:t>, if </a:t>
+                      </a:r>
+                      <a:r>
+                        <a:rPr lang="en-US" altLang="ko-KR" dirty="0" err="1"/>
+                        <a:t>jumpCount</a:t>
+                      </a:r>
+                      <a:r>
+                        <a:rPr lang="en-US" altLang="ko-KR" dirty="0"/>
+                        <a:t> == 2: False</a:t>
+                      </a:r>
+                      <a:endParaRPr lang="ko-KR" altLang="en-US" dirty="0"/>
+                    </a:p>
+                  </a:txBody>
+                  <a:tcPr anchor="ctr"/>
+                </a:tc>
+                <a:extLst>
+                  <a:ext uri="{0D108BD9-81ED-4DB2-BD59-A6C34878D82A}">
+                    <a16:rowId xmlns:a16="http://schemas.microsoft.com/office/drawing/2014/main" val="2708299726"/>
+                  </a:ext>
+                </a:extLst>
+              </a:tr>
+              <a:tr h="370840">
+                <a:tc vMerge="1">
+                  <a:txBody>
+                    <a:bodyPr/>
+                    <a:lstStyle/>
+                    <a:p>
+                      <a:pPr marL="0" marR="0" lvl="0" indent="0" algn="ctr" defTabSz="914400" rtl="0" eaLnBrk="1" fontAlgn="auto" latinLnBrk="1" hangingPunct="1">
+                        <a:lnSpc>
+                          <a:spcPct val="100000"/>
+                        </a:lnSpc>
+                        <a:spcBef>
+                          <a:spcPts val="0"/>
+                        </a:spcBef>
+                        <a:spcAft>
+                          <a:spcPts val="0"/>
+                        </a:spcAft>
+                        <a:buClrTx/>
+                        <a:buSzTx/>
+                        <a:buFontTx/>
+                        <a:buNone/>
+                        <a:tabLst/>
+                        <a:defRPr/>
+                      </a:pPr>
+                      <a:r>
+                        <a:rPr lang="en-US" altLang="ko-KR" dirty="0" err="1"/>
+                        <a:t>get_info</a:t>
+                      </a:r>
+                      <a:endParaRPr lang="ko-KR" altLang="en-US" dirty="0"/>
+                    </a:p>
+                  </a:txBody>
+                  <a:tcPr anchor="ctr"/>
+                </a:tc>
+                <a:tc>
+                  <a:txBody>
+                    <a:bodyPr/>
+                    <a:lstStyle/>
+                    <a:p>
+                      <a:pPr algn="ctr" latinLnBrk="1"/>
+                      <a:r>
+                        <a:rPr lang="en-US" altLang="ko-KR" dirty="0" err="1"/>
+                        <a:t>jumpCount</a:t>
+                      </a:r>
+                      <a:endParaRPr lang="ko-KR" altLang="en-US" dirty="0"/>
+                    </a:p>
+                  </a:txBody>
+                  <a:tcPr anchor="ctr"/>
+                </a:tc>
+                <a:tc>
+                  <a:txBody>
+                    <a:bodyPr/>
+                    <a:lstStyle/>
+                    <a:p>
+                      <a:pPr marL="0" marR="0" lvl="0" indent="0" algn="ctr" defTabSz="914400" rtl="0" eaLnBrk="1" fontAlgn="auto" latinLnBrk="1" hangingPunct="1">
+                        <a:lnSpc>
+                          <a:spcPct val="100000"/>
+                        </a:lnSpc>
+                        <a:spcBef>
+                          <a:spcPts val="0"/>
+                        </a:spcBef>
+                        <a:spcAft>
+                          <a:spcPts val="0"/>
+                        </a:spcAft>
+                        <a:buClrTx/>
+                        <a:buSzTx/>
+                        <a:buFontTx/>
+                        <a:buNone/>
+                        <a:tabLst/>
+                        <a:defRPr/>
+                      </a:pPr>
+                      <a:r>
+                        <a:rPr lang="en-US" altLang="ko-KR" dirty="0"/>
+                        <a:t>Int(0~2)</a:t>
+                      </a:r>
+                      <a:endParaRPr lang="ko-KR" altLang="en-US" dirty="0"/>
+                    </a:p>
+                  </a:txBody>
+                  <a:tcPr anchor="ctr"/>
+                </a:tc>
+                <a:tc>
+                  <a:txBody>
+                    <a:bodyPr/>
+                    <a:lstStyle/>
+                    <a:p>
+                      <a:pPr algn="ctr" latinLnBrk="1"/>
+                      <a:r>
+                        <a:rPr lang="ko-KR" altLang="en-US" dirty="0"/>
+                        <a:t>점프 최대 가능 횟수 제한</a:t>
+                      </a:r>
+                    </a:p>
+                  </a:txBody>
+                  <a:tcPr anchor="ctr"/>
+                </a:tc>
+                <a:extLst>
+                  <a:ext uri="{0D108BD9-81ED-4DB2-BD59-A6C34878D82A}">
+                    <a16:rowId xmlns:a16="http://schemas.microsoft.com/office/drawing/2014/main" val="1912452233"/>
+                  </a:ext>
+                </a:extLst>
+              </a:tr>
+              <a:tr h="370840">
+                <a:tc vMerge="1">
+                  <a:txBody>
+                    <a:bodyPr/>
+                    <a:lstStyle/>
+                    <a:p>
+                      <a:pPr marL="0" marR="0" lvl="0" indent="0" algn="ctr" defTabSz="914400" rtl="0" eaLnBrk="1" fontAlgn="auto" latinLnBrk="1" hangingPunct="1">
+                        <a:lnSpc>
+                          <a:spcPct val="100000"/>
+                        </a:lnSpc>
+                        <a:spcBef>
+                          <a:spcPts val="0"/>
+                        </a:spcBef>
+                        <a:spcAft>
+                          <a:spcPts val="0"/>
+                        </a:spcAft>
+                        <a:buClrTx/>
+                        <a:buSzTx/>
+                        <a:buFontTx/>
+                        <a:buNone/>
+                        <a:tabLst/>
+                        <a:defRPr/>
+                      </a:pPr>
+                      <a:r>
+                        <a:rPr lang="en-US" altLang="ko-KR" dirty="0" err="1"/>
+                        <a:t>edit_score</a:t>
+                      </a:r>
+                      <a:endParaRPr lang="ko-KR" altLang="en-US" dirty="0"/>
+                    </a:p>
+                  </a:txBody>
+                  <a:tcPr anchor="ctr"/>
+                </a:tc>
+                <a:tc>
+                  <a:txBody>
+                    <a:bodyPr/>
+                    <a:lstStyle/>
+                    <a:p>
+                      <a:pPr algn="ctr" latinLnBrk="1"/>
+                      <a:r>
+                        <a:rPr lang="en-US" altLang="ko-KR" dirty="0" err="1"/>
+                        <a:t>Jump_size</a:t>
+                      </a:r>
+                      <a:endParaRPr lang="ko-KR" altLang="en-US" dirty="0"/>
+                    </a:p>
+                  </a:txBody>
+                  <a:tcPr anchor="ctr"/>
+                </a:tc>
+                <a:tc>
+                  <a:txBody>
+                    <a:bodyPr/>
+                    <a:lstStyle/>
+                    <a:p>
+                      <a:pPr algn="ctr" latinLnBrk="1"/>
+                      <a:r>
+                        <a:rPr lang="en-US" altLang="ko-KR" dirty="0"/>
+                        <a:t>Int(5~10)</a:t>
+                      </a:r>
+                      <a:endParaRPr lang="ko-KR" altLang="en-US" dirty="0"/>
+                    </a:p>
+                  </a:txBody>
+                  <a:tcPr anchor="ctr"/>
+                </a:tc>
+                <a:tc>
+                  <a:txBody>
+                    <a:bodyPr/>
+                    <a:lstStyle/>
+                    <a:p>
+                      <a:pPr algn="ctr" latinLnBrk="1"/>
+                      <a:r>
+                        <a:rPr lang="ko-KR" altLang="en-US" dirty="0"/>
+                        <a:t>높이마다 달라지는 </a:t>
+                      </a:r>
+                      <a:r>
+                        <a:rPr lang="en-US" altLang="ko-KR" dirty="0"/>
+                        <a:t>y</a:t>
+                      </a:r>
+                      <a:r>
+                        <a:rPr lang="ko-KR" altLang="en-US" dirty="0"/>
+                        <a:t>변화량</a:t>
+                      </a:r>
+                      <a:r>
+                        <a:rPr lang="en-US" altLang="ko-KR" dirty="0"/>
+                        <a:t>, </a:t>
+                      </a:r>
+                      <a:r>
+                        <a:rPr lang="ko-KR" altLang="en-US" dirty="0"/>
+                        <a:t>즉 점프 속도</a:t>
+                      </a:r>
+                      <a:r>
+                        <a:rPr lang="en-US" altLang="ko-KR" dirty="0"/>
+                        <a:t>?</a:t>
+                      </a:r>
+                      <a:endParaRPr lang="ko-KR" altLang="en-US" dirty="0"/>
+                    </a:p>
+                  </a:txBody>
+                  <a:tcPr anchor="ctr"/>
+                </a:tc>
+                <a:extLst>
+                  <a:ext uri="{0D108BD9-81ED-4DB2-BD59-A6C34878D82A}">
+                    <a16:rowId xmlns:a16="http://schemas.microsoft.com/office/drawing/2014/main" val="1053291668"/>
+                  </a:ext>
+                </a:extLst>
+              </a:tr>
+              <a:tr h="370840">
+                <a:tc vMerge="1">
+                  <a:txBody>
+                    <a:bodyPr/>
+                    <a:lstStyle/>
+                    <a:p>
+                      <a:pPr marL="0" marR="0" lvl="0" indent="0" algn="ctr" defTabSz="914400" rtl="0" eaLnBrk="1" fontAlgn="auto" latinLnBrk="1" hangingPunct="1">
+                        <a:lnSpc>
+                          <a:spcPct val="100000"/>
+                        </a:lnSpc>
+                        <a:spcBef>
+                          <a:spcPts val="0"/>
+                        </a:spcBef>
+                        <a:spcAft>
+                          <a:spcPts val="0"/>
+                        </a:spcAft>
+                        <a:buClrTx/>
+                        <a:buSzTx/>
+                        <a:buFontTx/>
+                        <a:buNone/>
+                        <a:tabLst/>
+                        <a:defRPr/>
+                      </a:pPr>
+                      <a:r>
+                        <a:rPr lang="en-US" altLang="ko-KR" dirty="0" err="1"/>
+                        <a:t>db_add</a:t>
+                      </a:r>
+                      <a:endParaRPr lang="ko-KR" altLang="en-US" dirty="0"/>
+                    </a:p>
+                  </a:txBody>
+                  <a:tcPr anchor="ctr"/>
+                </a:tc>
+                <a:tc>
+                  <a:txBody>
+                    <a:bodyPr/>
+                    <a:lstStyle/>
+                    <a:p>
+                      <a:pPr algn="ctr" latinLnBrk="1"/>
+                      <a:r>
+                        <a:rPr lang="en-US" altLang="ko-KR" dirty="0"/>
+                        <a:t>aim</a:t>
+                      </a:r>
+                      <a:endParaRPr lang="ko-KR" altLang="en-US" dirty="0"/>
+                    </a:p>
+                  </a:txBody>
+                  <a:tcPr anchor="ctr"/>
+                </a:tc>
+                <a:tc>
+                  <a:txBody>
+                    <a:bodyPr/>
+                    <a:lstStyle/>
+                    <a:p>
+                      <a:pPr algn="ctr" latinLnBrk="1"/>
+                      <a:r>
+                        <a:rPr lang="en-US" altLang="ko-KR" dirty="0"/>
+                        <a:t>Int? float?</a:t>
+                      </a:r>
+                      <a:endParaRPr lang="ko-KR" altLang="en-US" dirty="0"/>
+                    </a:p>
+                  </a:txBody>
+                  <a:tcPr anchor="ctr"/>
+                </a:tc>
+                <a:tc>
+                  <a:txBody>
+                    <a:bodyPr/>
+                    <a:lstStyle/>
+                    <a:p>
+                      <a:pPr algn="ctr" latinLnBrk="1"/>
+                      <a:r>
+                        <a:rPr lang="en-US" altLang="ko-KR" dirty="0"/>
+                        <a:t>Jump</a:t>
+                      </a:r>
+                      <a:r>
+                        <a:rPr lang="ko-KR" altLang="en-US" dirty="0"/>
+                        <a:t> 최대 목표치</a:t>
+                      </a:r>
+                    </a:p>
+                  </a:txBody>
+                  <a:tcPr anchor="ctr"/>
+                </a:tc>
+                <a:extLst>
+                  <a:ext uri="{0D108BD9-81ED-4DB2-BD59-A6C34878D82A}">
+                    <a16:rowId xmlns:a16="http://schemas.microsoft.com/office/drawing/2014/main" val="62366673"/>
+                  </a:ext>
+                </a:extLst>
+              </a:tr>
+              <a:tr h="370840">
+                <a:tc vMerge="1">
+                  <a:txBody>
+                    <a:bodyPr/>
+                    <a:lstStyle/>
+                    <a:p>
+                      <a:pPr algn="ctr" latinLnBrk="1"/>
+                      <a:endParaRPr lang="en-US" altLang="ko-KR" dirty="0"/>
+                    </a:p>
+                  </a:txBody>
+                  <a:tcPr anchor="ctr"/>
+                </a:tc>
+                <a:tc>
+                  <a:txBody>
+                    <a:bodyPr/>
+                    <a:lstStyle/>
+                    <a:p>
+                      <a:pPr algn="ctr" latinLnBrk="1"/>
+                      <a:r>
+                        <a:rPr lang="en-US" altLang="ko-KR" dirty="0"/>
+                        <a:t>Up</a:t>
+                      </a:r>
+                      <a:endParaRPr lang="ko-KR" altLang="en-US" dirty="0"/>
+                    </a:p>
+                  </a:txBody>
+                  <a:tcPr anchor="ctr"/>
+                </a:tc>
+                <a:tc>
+                  <a:txBody>
+                    <a:bodyPr/>
+                    <a:lstStyle/>
+                    <a:p>
+                      <a:pPr algn="ctr" latinLnBrk="1"/>
+                      <a:r>
+                        <a:rPr lang="en-US" altLang="ko-KR" dirty="0" err="1"/>
+                        <a:t>boolean</a:t>
+                      </a:r>
+                      <a:endParaRPr lang="ko-KR" altLang="en-US" dirty="0"/>
+                    </a:p>
+                  </a:txBody>
+                  <a:tcPr anchor="ctr"/>
+                </a:tc>
+                <a:tc>
+                  <a:txBody>
+                    <a:bodyPr/>
+                    <a:lstStyle/>
+                    <a:p>
+                      <a:pPr algn="ctr" latinLnBrk="1"/>
+                      <a:endParaRPr lang="ko-KR" altLang="en-US" dirty="0"/>
+                    </a:p>
+                  </a:txBody>
+                  <a:tcPr anchor="ctr"/>
+                </a:tc>
+                <a:extLst>
+                  <a:ext uri="{0D108BD9-81ED-4DB2-BD59-A6C34878D82A}">
+                    <a16:rowId xmlns:a16="http://schemas.microsoft.com/office/drawing/2014/main" val="1928731522"/>
+                  </a:ext>
+                </a:extLst>
+              </a:tr>
+              <a:tr h="370840">
+                <a:tc>
+                  <a:txBody>
+                    <a:bodyPr/>
+                    <a:lstStyle/>
+                    <a:p>
+                      <a:pPr marL="0" marR="0" lvl="0" indent="0" algn="ctr" defTabSz="914400" rtl="0" eaLnBrk="1" fontAlgn="auto" latinLnBrk="1" hangingPunct="1">
+                        <a:lnSpc>
+                          <a:spcPct val="100000"/>
+                        </a:lnSpc>
+                        <a:spcBef>
+                          <a:spcPts val="0"/>
+                        </a:spcBef>
+                        <a:spcAft>
+                          <a:spcPts val="0"/>
+                        </a:spcAft>
+                        <a:buClrTx/>
+                        <a:buSzTx/>
+                        <a:buFontTx/>
+                        <a:buNone/>
+                        <a:tabLst/>
+                        <a:defRPr/>
+                      </a:pPr>
+                      <a:r>
+                        <a:rPr lang="en-US" altLang="ko-KR" dirty="0"/>
+                        <a:t>slide</a:t>
+                      </a:r>
+                      <a:endParaRPr lang="ko-KR" altLang="en-US" dirty="0"/>
+                    </a:p>
+                  </a:txBody>
+                  <a:tcPr anchor="ctr"/>
+                </a:tc>
+                <a:tc>
+                  <a:txBody>
+                    <a:bodyPr/>
+                    <a:lstStyle/>
+                    <a:p>
+                      <a:pPr algn="ctr" latinLnBrk="1"/>
+                      <a:r>
+                        <a:rPr lang="en-US" altLang="ko-KR" dirty="0" err="1"/>
+                        <a:t>isSliding</a:t>
+                      </a:r>
+                      <a:endParaRPr lang="ko-KR" altLang="en-US" dirty="0"/>
+                    </a:p>
+                  </a:txBody>
+                  <a:tcPr anchor="ctr"/>
+                </a:tc>
+                <a:tc>
+                  <a:txBody>
+                    <a:bodyPr/>
+                    <a:lstStyle/>
+                    <a:p>
+                      <a:pPr algn="ctr" latinLnBrk="1"/>
+                      <a:r>
+                        <a:rPr lang="en-US" altLang="ko-KR" dirty="0" err="1"/>
+                        <a:t>boolean</a:t>
+                      </a:r>
+                      <a:endParaRPr lang="ko-KR" altLang="en-US" dirty="0"/>
+                    </a:p>
+                  </a:txBody>
+                  <a:tcPr anchor="ctr"/>
+                </a:tc>
+                <a:tc>
+                  <a:txBody>
+                    <a:bodyPr/>
+                    <a:lstStyle/>
+                    <a:p>
+                      <a:pPr algn="ctr" latinLnBrk="1"/>
+                      <a:r>
+                        <a:rPr lang="en-US" altLang="ko-KR" dirty="0" err="1"/>
+                        <a:t>down_key</a:t>
+                      </a:r>
+                      <a:r>
+                        <a:rPr lang="en-US" altLang="ko-KR" dirty="0"/>
+                        <a:t> </a:t>
+                      </a:r>
+                      <a:r>
+                        <a:rPr lang="ko-KR" altLang="en-US" dirty="0"/>
+                        <a:t>누르고 뗄 때까지 </a:t>
+                      </a:r>
+                      <a:r>
+                        <a:rPr lang="en-US" altLang="ko-KR" dirty="0"/>
+                        <a:t>slide.</a:t>
+                      </a:r>
+                      <a:r>
+                        <a:rPr lang="ko-KR" altLang="en-US" dirty="0"/>
+                        <a:t> 이 때 제어 </a:t>
+                      </a:r>
+                      <a:r>
+                        <a:rPr lang="en-US" altLang="ko-KR" dirty="0"/>
+                        <a:t>flag</a:t>
+                      </a:r>
+                    </a:p>
+                  </a:txBody>
+                  <a:tcPr anchor="ctr"/>
+                </a:tc>
+                <a:extLst>
+                  <a:ext uri="{0D108BD9-81ED-4DB2-BD59-A6C34878D82A}">
+                    <a16:rowId xmlns:a16="http://schemas.microsoft.com/office/drawing/2014/main" val="538424159"/>
+                  </a:ext>
+                </a:extLst>
+              </a:tr>
+            </a:tbl>
+          </a:graphicData>
+        </a:graphic>
+      </p:graphicFrame>
+    </p:spTree>
+    <p:extLst>
+      <p:ext uri="{BB962C8B-B14F-4D97-AF65-F5344CB8AC3E}">
+        <p14:creationId xmlns:p14="http://schemas.microsoft.com/office/powerpoint/2010/main" val="2953943690"/>
+      </p:ext>
+    </p:extLst>
+  </p:cSld>
+  <p:clrMapOvr>
+    <a:masterClrMapping/>
+  </p:clrMapOvr>
+</p:sld>
+</file>
+
+<file path=ppt/slides/slide12.xml><?xml version="1.0" encoding="utf-8"?>
+<p:sld xmlns:a="http://schemas.openxmlformats.org/drawingml/2006/main" xmlns:r="http://schemas.openxmlformats.org/officeDocument/2006/relationships" xmlns:p="http://schemas.openxmlformats.org/presentationml/2006/main">
+  <p:cSld>
+    <p:spTree>
+      <p:nvGrpSpPr>
+        <p:cNvPr id="1" name=""/>
+        <p:cNvGrpSpPr/>
+        <p:nvPr/>
+      </p:nvGrpSpPr>
+      <p:grpSpPr>
+        <a:xfrm>
+          <a:off x="0" y="0"/>
+          <a:ext cx="0" cy="0"/>
+          <a:chOff x="0" y="0"/>
+          <a:chExt cx="0" cy="0"/>
+        </a:xfrm>
+      </p:grpSpPr>
+      <p:sp>
+        <p:nvSpPr>
+          <p:cNvPr id="2" name="제목 1">
+            <a:extLst>
+              <a:ext uri="{FF2B5EF4-FFF2-40B4-BE49-F238E27FC236}">
                 <a16:creationId xmlns:a16="http://schemas.microsoft.com/office/drawing/2014/main" id="{DDCDC4D4-A8FE-4565-875E-3BE45B76251A}"/>
               </a:ext>
             </a:extLst>
@@ -6053,7 +6942,7 @@
 </p:sld>
 </file>
 
-<file path=ppt/slides/slide12.xml><?xml version="1.0" encoding="utf-8"?>
+<file path=ppt/slides/slide13.xml><?xml version="1.0" encoding="utf-8"?>
 <p:sld xmlns:a="http://schemas.openxmlformats.org/drawingml/2006/main" xmlns:r="http://schemas.openxmlformats.org/officeDocument/2006/relationships" xmlns:p="http://schemas.openxmlformats.org/presentationml/2006/main">
   <p:cSld>
     <p:spTree>
@@ -6217,7 +7106,7 @@
 </p:sld>
 </file>
 
-<file path=ppt/slides/slide13.xml><?xml version="1.0" encoding="utf-8"?>
+<file path=ppt/slides/slide14.xml><?xml version="1.0" encoding="utf-8"?>
 <p:sld xmlns:a="http://schemas.openxmlformats.org/drawingml/2006/main" xmlns:r="http://schemas.openxmlformats.org/officeDocument/2006/relationships" xmlns:p="http://schemas.openxmlformats.org/presentationml/2006/main">
   <p:cSld>
     <p:spTree>
@@ -6380,7 +7269,7 @@
 </p:sld>
 </file>
 
-<file path=ppt/slides/slide14.xml><?xml version="1.0" encoding="utf-8"?>
+<file path=ppt/slides/slide15.xml><?xml version="1.0" encoding="utf-8"?>
 <p:sld xmlns:a="http://schemas.openxmlformats.org/drawingml/2006/main" xmlns:r="http://schemas.openxmlformats.org/officeDocument/2006/relationships" xmlns:p="http://schemas.openxmlformats.org/presentationml/2006/main">
   <p:cSld>
     <p:spTree>

</xml_diff>